<commit_message>
Added more notes to presentation
</commit_message>
<xml_diff>
--- a/ERLSOM.pptx
+++ b/ERLSOM.pptx
@@ -16,9 +16,9 @@
     <p:sldId id="262" r:id="rId7"/>
     <p:sldId id="263" r:id="rId8"/>
     <p:sldId id="264" r:id="rId9"/>
-    <p:sldId id="265" r:id="rId10"/>
-    <p:sldId id="267" r:id="rId11"/>
-    <p:sldId id="266" r:id="rId12"/>
+    <p:sldId id="267" r:id="rId10"/>
+    <p:sldId id="266" r:id="rId11"/>
+    <p:sldId id="265" r:id="rId12"/>
   </p:sldIdLst>
   <p:sldSz cx="12192000" cy="6858000"/>
   <p:notesSz cx="6858000" cy="9144000"/>
@@ -207,7 +207,7 @@
           <a:p>
             <a:fld id="{76E9623C-B78D-41A0-A264-8A28E7A7AC15}" type="datetimeFigureOut">
               <a:rPr lang="pl-PL" smtClean="0"/>
-              <a:t>2016-01-13</a:t>
+              <a:t>2016-01-14</a:t>
             </a:fld>
             <a:endParaRPr lang="pl-PL"/>
           </a:p>
@@ -521,14 +521,40 @@
           <a:p>
             <a:r>
               <a:rPr lang="pl-PL" dirty="0" smtClean="0"/>
-              <a:t>Prosta</a:t>
+              <a:t>Sax </a:t>
+            </a:r>
+            <a:r>
+              <a:rPr lang="pl-PL" dirty="0" err="1" smtClean="0"/>
+              <a:t>parser</a:t>
             </a:r>
             <a:r>
               <a:rPr lang="pl-PL" baseline="0" dirty="0" smtClean="0"/>
-              <a:t> w zrozumieniu forma kosztem tego, że trzeba wyszukiwać dane a nie mamy ich podanych na tacy jak w przypadku innych co nie</a:t>
-            </a:r>
-          </a:p>
-          <a:p>
+              <a:t> jest to poniekąd już standaryzowany model </a:t>
+            </a:r>
+            <a:r>
+              <a:rPr lang="pl-PL" baseline="0" dirty="0" err="1" smtClean="0"/>
+              <a:t>parsera</a:t>
+            </a:r>
+            <a:r>
+              <a:rPr lang="pl-PL" baseline="0" dirty="0" smtClean="0"/>
+              <a:t> </a:t>
+            </a:r>
+            <a:r>
+              <a:rPr lang="pl-PL" baseline="0" dirty="0" err="1" smtClean="0"/>
+              <a:t>xml</a:t>
+            </a:r>
+            <a:r>
+              <a:rPr lang="pl-PL" baseline="0" dirty="0" smtClean="0"/>
+              <a:t>. Doskonale wpasowuje się w styl programowania </a:t>
+            </a:r>
+            <a:r>
+              <a:rPr lang="pl-PL" baseline="0" dirty="0" err="1" smtClean="0"/>
+              <a:t>Erlanga</a:t>
+            </a:r>
+            <a:r>
+              <a:rPr lang="pl-PL" baseline="0" dirty="0" smtClean="0"/>
+              <a:t>.</a:t>
+            </a:r>
             <a:endParaRPr lang="pl-PL" dirty="0"/>
           </a:p>
         </p:txBody>
@@ -550,7 +576,7 @@
           <a:p>
             <a:fld id="{F3BFA227-03A3-403A-8E47-AD08D7861F6D}" type="slidenum">
               <a:rPr lang="pl-PL" smtClean="0"/>
-              <a:t>4</a:t>
+              <a:t>3</a:t>
             </a:fld>
             <a:endParaRPr lang="pl-PL"/>
           </a:p>
@@ -559,7 +585,7 @@
     </p:spTree>
     <p:extLst>
       <p:ext uri="{BB962C8B-B14F-4D97-AF65-F5344CB8AC3E}">
-        <p14:creationId xmlns:p14="http://schemas.microsoft.com/office/powerpoint/2010/main" val="3635758044"/>
+        <p14:creationId xmlns:p14="http://schemas.microsoft.com/office/powerpoint/2010/main" val="1995972824"/>
       </p:ext>
     </p:extLst>
   </p:cSld>
@@ -615,34 +641,33 @@
           <a:p>
             <a:r>
               <a:rPr lang="pl-PL" dirty="0" smtClean="0"/>
-              <a:t>Przewaga</a:t>
+              <a:t>Prosta</a:t>
             </a:r>
             <a:r>
               <a:rPr lang="pl-PL" baseline="0" dirty="0" smtClean="0"/>
-              <a:t> nad </a:t>
+              <a:t> w zrozumieniu </a:t>
+            </a:r>
+            <a:r>
+              <a:rPr lang="pl-PL" baseline="0" dirty="0" smtClean="0"/>
+              <a:t>forma. Nie ma takich możliwości jak </a:t>
             </a:r>
             <a:r>
               <a:rPr lang="pl-PL" baseline="0" dirty="0" err="1" smtClean="0"/>
-              <a:t>SAX’em</a:t>
+              <a:t>sax</a:t>
             </a:r>
             <a:r>
               <a:rPr lang="pl-PL" baseline="0" dirty="0" smtClean="0"/>
-              <a:t> jest taka, że dodatkowo sprawdza poprawność struktury pliku </a:t>
+              <a:t> </a:t>
             </a:r>
             <a:r>
               <a:rPr lang="pl-PL" baseline="0" dirty="0" err="1" smtClean="0"/>
-              <a:t>xml</a:t>
+              <a:t>parser</a:t>
             </a:r>
             <a:r>
               <a:rPr lang="pl-PL" baseline="0" dirty="0" smtClean="0"/>
-              <a:t>.</a:t>
-            </a:r>
-          </a:p>
-          <a:p>
-            <a:r>
-              <a:rPr lang="pl-PL" baseline="0" dirty="0" smtClean="0"/>
-              <a:t>Pozwala na bezpośredni dostęp do elementów..</a:t>
-            </a:r>
+              <a:t>, czyli wszystko wczytywane jest na raz. W zasadzie nie pokrywa się w 100% z modelem DOM ale w zamian dostarcza bardzo prosty w zrozumieniu format.</a:t>
+            </a:r>
+            <a:endParaRPr lang="pl-PL" dirty="0"/>
           </a:p>
         </p:txBody>
       </p:sp>
@@ -663,7 +688,7 @@
           <a:p>
             <a:fld id="{F3BFA227-03A3-403A-8E47-AD08D7861F6D}" type="slidenum">
               <a:rPr lang="pl-PL" smtClean="0"/>
-              <a:t>5</a:t>
+              <a:t>4</a:t>
             </a:fld>
             <a:endParaRPr lang="pl-PL"/>
           </a:p>
@@ -672,7 +697,7 @@
     </p:spTree>
     <p:extLst>
       <p:ext uri="{BB962C8B-B14F-4D97-AF65-F5344CB8AC3E}">
-        <p14:creationId xmlns:p14="http://schemas.microsoft.com/office/powerpoint/2010/main" val="2068438736"/>
+        <p14:creationId xmlns:p14="http://schemas.microsoft.com/office/powerpoint/2010/main" val="3635758044"/>
       </p:ext>
     </p:extLst>
   </p:cSld>
@@ -727,6 +752,129 @@
           <a:lstStyle/>
           <a:p>
             <a:r>
+              <a:rPr lang="pl-PL" dirty="0" smtClean="0"/>
+              <a:t>Przewaga</a:t>
+            </a:r>
+            <a:r>
+              <a:rPr lang="pl-PL" baseline="0" dirty="0" smtClean="0"/>
+              <a:t> nad </a:t>
+            </a:r>
+            <a:r>
+              <a:rPr lang="pl-PL" baseline="0" dirty="0" err="1" smtClean="0"/>
+              <a:t>SAX’em</a:t>
+            </a:r>
+            <a:r>
+              <a:rPr lang="pl-PL" baseline="0" dirty="0" smtClean="0"/>
+              <a:t> jest taka, że dodatkowo sprawdza poprawność struktury pliku </a:t>
+            </a:r>
+            <a:r>
+              <a:rPr lang="pl-PL" baseline="0" dirty="0" err="1" smtClean="0"/>
+              <a:t>xml</a:t>
+            </a:r>
+            <a:r>
+              <a:rPr lang="pl-PL" baseline="0" dirty="0" smtClean="0"/>
+              <a:t>. Stworzony na bazie </a:t>
+            </a:r>
+            <a:r>
+              <a:rPr lang="pl-PL" baseline="0" dirty="0" err="1" smtClean="0"/>
+              <a:t>sax</a:t>
+            </a:r>
+            <a:endParaRPr lang="pl-PL" baseline="0" dirty="0" smtClean="0"/>
+          </a:p>
+          <a:p>
+            <a:r>
+              <a:rPr lang="pl-PL" baseline="0" dirty="0" smtClean="0"/>
+              <a:t>Pozwala na bezpośredni dostęp do elementów</a:t>
+            </a:r>
+            <a:r>
+              <a:rPr lang="pl-PL" baseline="0" dirty="0" smtClean="0"/>
+              <a:t>.</a:t>
+            </a:r>
+            <a:endParaRPr lang="pl-PL" baseline="0" dirty="0" smtClean="0"/>
+          </a:p>
+        </p:txBody>
+      </p:sp>
+      <p:sp>
+        <p:nvSpPr>
+          <p:cNvPr id="4" name="Symbol zastępczy numeru slajdu 3"/>
+          <p:cNvSpPr>
+            <a:spLocks noGrp="1"/>
+          </p:cNvSpPr>
+          <p:nvPr>
+            <p:ph type="sldNum" sz="quarter" idx="10"/>
+          </p:nvPr>
+        </p:nvSpPr>
+        <p:spPr/>
+        <p:txBody>
+          <a:bodyPr/>
+          <a:lstStyle/>
+          <a:p>
+            <a:fld id="{F3BFA227-03A3-403A-8E47-AD08D7861F6D}" type="slidenum">
+              <a:rPr lang="pl-PL" smtClean="0"/>
+              <a:t>5</a:t>
+            </a:fld>
+            <a:endParaRPr lang="pl-PL"/>
+          </a:p>
+        </p:txBody>
+      </p:sp>
+    </p:spTree>
+    <p:extLst>
+      <p:ext uri="{BB962C8B-B14F-4D97-AF65-F5344CB8AC3E}">
+        <p14:creationId xmlns:p14="http://schemas.microsoft.com/office/powerpoint/2010/main" val="2068438736"/>
+      </p:ext>
+    </p:extLst>
+  </p:cSld>
+  <p:clrMapOvr>
+    <a:masterClrMapping/>
+  </p:clrMapOvr>
+</p:notes>
+</file>
+
+<file path=ppt/notesSlides/notesSlide4.xml><?xml version="1.0" encoding="utf-8"?>
+<p:notes xmlns:a="http://schemas.openxmlformats.org/drawingml/2006/main" xmlns:r="http://schemas.openxmlformats.org/officeDocument/2006/relationships" xmlns:p="http://schemas.openxmlformats.org/presentationml/2006/main">
+  <p:cSld>
+    <p:spTree>
+      <p:nvGrpSpPr>
+        <p:cNvPr id="1" name=""/>
+        <p:cNvGrpSpPr/>
+        <p:nvPr/>
+      </p:nvGrpSpPr>
+      <p:grpSpPr>
+        <a:xfrm>
+          <a:off x="0" y="0"/>
+          <a:ext cx="0" cy="0"/>
+          <a:chOff x="0" y="0"/>
+          <a:chExt cx="0" cy="0"/>
+        </a:xfrm>
+      </p:grpSpPr>
+      <p:sp>
+        <p:nvSpPr>
+          <p:cNvPr id="2" name="Symbol zastępczy obrazu slajdu 1"/>
+          <p:cNvSpPr>
+            <a:spLocks noGrp="1" noRot="1" noChangeAspect="1"/>
+          </p:cNvSpPr>
+          <p:nvPr>
+            <p:ph type="sldImg"/>
+          </p:nvPr>
+        </p:nvSpPr>
+        <p:spPr/>
+      </p:sp>
+      <p:sp>
+        <p:nvSpPr>
+          <p:cNvPr id="3" name="Symbol zastępczy notatek 2"/>
+          <p:cNvSpPr>
+            <a:spLocks noGrp="1"/>
+          </p:cNvSpPr>
+          <p:nvPr>
+            <p:ph type="body" idx="1"/>
+          </p:nvPr>
+        </p:nvSpPr>
+        <p:spPr/>
+        <p:txBody>
+          <a:bodyPr/>
+          <a:lstStyle/>
+          <a:p>
+            <a:r>
               <a:rPr lang="en-US" dirty="0" smtClean="0"/>
               <a:t>Using binaries as input has a positive effect on the memory usage and on the speed (provided that you are using </a:t>
             </a:r>
@@ -777,6 +925,142 @@
     <p:extLst>
       <p:ext uri="{BB962C8B-B14F-4D97-AF65-F5344CB8AC3E}">
         <p14:creationId xmlns:p14="http://schemas.microsoft.com/office/powerpoint/2010/main" val="1026737494"/>
+      </p:ext>
+    </p:extLst>
+  </p:cSld>
+  <p:clrMapOvr>
+    <a:masterClrMapping/>
+  </p:clrMapOvr>
+</p:notes>
+</file>
+
+<file path=ppt/notesSlides/notesSlide5.xml><?xml version="1.0" encoding="utf-8"?>
+<p:notes xmlns:a="http://schemas.openxmlformats.org/drawingml/2006/main" xmlns:r="http://schemas.openxmlformats.org/officeDocument/2006/relationships" xmlns:p="http://schemas.openxmlformats.org/presentationml/2006/main">
+  <p:cSld>
+    <p:spTree>
+      <p:nvGrpSpPr>
+        <p:cNvPr id="1" name=""/>
+        <p:cNvGrpSpPr/>
+        <p:nvPr/>
+      </p:nvGrpSpPr>
+      <p:grpSpPr>
+        <a:xfrm>
+          <a:off x="0" y="0"/>
+          <a:ext cx="0" cy="0"/>
+          <a:chOff x="0" y="0"/>
+          <a:chExt cx="0" cy="0"/>
+        </a:xfrm>
+      </p:grpSpPr>
+      <p:sp>
+        <p:nvSpPr>
+          <p:cNvPr id="2" name="Symbol zastępczy obrazu slajdu 1"/>
+          <p:cNvSpPr>
+            <a:spLocks noGrp="1" noRot="1" noChangeAspect="1"/>
+          </p:cNvSpPr>
+          <p:nvPr>
+            <p:ph type="sldImg"/>
+          </p:nvPr>
+        </p:nvSpPr>
+        <p:spPr/>
+      </p:sp>
+      <p:sp>
+        <p:nvSpPr>
+          <p:cNvPr id="3" name="Symbol zastępczy notatek 2"/>
+          <p:cNvSpPr>
+            <a:spLocks noGrp="1"/>
+          </p:cNvSpPr>
+          <p:nvPr>
+            <p:ph type="body" idx="1"/>
+          </p:nvPr>
+        </p:nvSpPr>
+        <p:spPr/>
+        <p:txBody>
+          <a:bodyPr/>
+          <a:lstStyle/>
+          <a:p>
+            <a:r>
+              <a:rPr lang="pl-PL" baseline="0" dirty="0" smtClean="0"/>
+              <a:t>Szczególnie w kontekście aplikacji internetowych p</a:t>
+            </a:r>
+            <a:r>
+              <a:rPr lang="pl-PL" dirty="0" smtClean="0"/>
+              <a:t>roblemem może być także nadmiarowe</a:t>
+            </a:r>
+            <a:r>
+              <a:rPr lang="pl-PL" baseline="0" dirty="0" smtClean="0"/>
+              <a:t> tworzenie się atomów, które są wynikiem komunikacji opartej na XML np. </a:t>
+            </a:r>
+            <a:r>
+              <a:rPr lang="pl-PL" baseline="0" dirty="0" err="1" smtClean="0"/>
+              <a:t>ajax</a:t>
+            </a:r>
+            <a:r>
+              <a:rPr lang="pl-PL" baseline="0" dirty="0" smtClean="0"/>
+              <a:t>. Jest to spowodowane tym, że liczba atomów jest ograniczona a przekroczenie wartości może zakończyć się </a:t>
+            </a:r>
+            <a:r>
+              <a:rPr lang="pl-PL" baseline="0" dirty="0" err="1" smtClean="0"/>
+              <a:t>crashem</a:t>
+            </a:r>
+            <a:r>
+              <a:rPr lang="pl-PL" baseline="0" dirty="0" smtClean="0"/>
+              <a:t>. </a:t>
+            </a:r>
+            <a:r>
+              <a:rPr lang="pl-PL" baseline="0" dirty="0" err="1" smtClean="0"/>
+              <a:t>Erlsom</a:t>
+            </a:r>
+            <a:r>
+              <a:rPr lang="pl-PL" baseline="0" dirty="0" smtClean="0"/>
+              <a:t> </a:t>
+            </a:r>
+            <a:r>
+              <a:rPr lang="pl-PL" baseline="0" dirty="0" err="1" smtClean="0"/>
+              <a:t>scan</a:t>
+            </a:r>
+            <a:r>
+              <a:rPr lang="pl-PL" baseline="0" dirty="0" smtClean="0"/>
+              <a:t>/2 nie tworzy nowych atomów a </a:t>
+            </a:r>
+            <a:r>
+              <a:rPr lang="pl-PL" baseline="0" dirty="0" err="1" smtClean="0"/>
+              <a:t>erlsom:compille_xsd</a:t>
+            </a:r>
+            <a:r>
+              <a:rPr lang="pl-PL" baseline="0" dirty="0" smtClean="0"/>
+              <a:t> już tak.</a:t>
+            </a:r>
+            <a:endParaRPr lang="pl-PL" dirty="0"/>
+          </a:p>
+        </p:txBody>
+      </p:sp>
+      <p:sp>
+        <p:nvSpPr>
+          <p:cNvPr id="4" name="Symbol zastępczy numeru slajdu 3"/>
+          <p:cNvSpPr>
+            <a:spLocks noGrp="1"/>
+          </p:cNvSpPr>
+          <p:nvPr>
+            <p:ph type="sldNum" sz="quarter" idx="10"/>
+          </p:nvPr>
+        </p:nvSpPr>
+        <p:spPr/>
+        <p:txBody>
+          <a:bodyPr/>
+          <a:lstStyle/>
+          <a:p>
+            <a:fld id="{F3BFA227-03A3-403A-8E47-AD08D7861F6D}" type="slidenum">
+              <a:rPr lang="pl-PL" smtClean="0"/>
+              <a:t>10</a:t>
+            </a:fld>
+            <a:endParaRPr lang="pl-PL"/>
+          </a:p>
+        </p:txBody>
+      </p:sp>
+    </p:spTree>
+    <p:extLst>
+      <p:ext uri="{BB962C8B-B14F-4D97-AF65-F5344CB8AC3E}">
+        <p14:creationId xmlns:p14="http://schemas.microsoft.com/office/powerpoint/2010/main" val="3792776006"/>
       </p:ext>
     </p:extLst>
   </p:cSld>
@@ -917,7 +1201,7 @@
           <a:p>
             <a:fld id="{A03164F3-704B-47FD-BDD7-A7DFDCB770AB}" type="datetimeFigureOut">
               <a:rPr lang="pl-PL" smtClean="0"/>
-              <a:t>2016-01-13</a:t>
+              <a:t>2016-01-14</a:t>
             </a:fld>
             <a:endParaRPr lang="pl-PL"/>
           </a:p>
@@ -975,6 +1259,9 @@
   <p:clrMapOvr>
     <a:masterClrMapping/>
   </p:clrMapOvr>
+  <p:transition spd="slow">
+    <p:push dir="u"/>
+  </p:transition>
 </p:sldLayout>
 </file>
 
@@ -1087,7 +1374,7 @@
           <a:p>
             <a:fld id="{A03164F3-704B-47FD-BDD7-A7DFDCB770AB}" type="datetimeFigureOut">
               <a:rPr lang="pl-PL" smtClean="0"/>
-              <a:t>2016-01-13</a:t>
+              <a:t>2016-01-14</a:t>
             </a:fld>
             <a:endParaRPr lang="pl-PL"/>
           </a:p>
@@ -1145,6 +1432,9 @@
   <p:clrMapOvr>
     <a:masterClrMapping/>
   </p:clrMapOvr>
+  <p:transition spd="slow">
+    <p:push dir="u"/>
+  </p:transition>
 </p:sldLayout>
 </file>
 
@@ -1267,7 +1557,7 @@
           <a:p>
             <a:fld id="{A03164F3-704B-47FD-BDD7-A7DFDCB770AB}" type="datetimeFigureOut">
               <a:rPr lang="pl-PL" smtClean="0"/>
-              <a:t>2016-01-13</a:t>
+              <a:t>2016-01-14</a:t>
             </a:fld>
             <a:endParaRPr lang="pl-PL"/>
           </a:p>
@@ -1325,6 +1615,9 @@
   <p:clrMapOvr>
     <a:masterClrMapping/>
   </p:clrMapOvr>
+  <p:transition spd="slow">
+    <p:push dir="u"/>
+  </p:transition>
 </p:sldLayout>
 </file>
 
@@ -1437,7 +1730,7 @@
           <a:p>
             <a:fld id="{A03164F3-704B-47FD-BDD7-A7DFDCB770AB}" type="datetimeFigureOut">
               <a:rPr lang="pl-PL" smtClean="0"/>
-              <a:t>2016-01-13</a:t>
+              <a:t>2016-01-14</a:t>
             </a:fld>
             <a:endParaRPr lang="pl-PL"/>
           </a:p>
@@ -1495,6 +1788,9 @@
   <p:clrMapOvr>
     <a:masterClrMapping/>
   </p:clrMapOvr>
+  <p:transition spd="slow">
+    <p:push dir="u"/>
+  </p:transition>
 </p:sldLayout>
 </file>
 
@@ -1683,7 +1979,7 @@
           <a:p>
             <a:fld id="{A03164F3-704B-47FD-BDD7-A7DFDCB770AB}" type="datetimeFigureOut">
               <a:rPr lang="pl-PL" smtClean="0"/>
-              <a:t>2016-01-13</a:t>
+              <a:t>2016-01-14</a:t>
             </a:fld>
             <a:endParaRPr lang="pl-PL"/>
           </a:p>
@@ -1741,6 +2037,9 @@
   <p:clrMapOvr>
     <a:masterClrMapping/>
   </p:clrMapOvr>
+  <p:transition spd="slow">
+    <p:push dir="u"/>
+  </p:transition>
 </p:sldLayout>
 </file>
 
@@ -1915,7 +2214,7 @@
           <a:p>
             <a:fld id="{A03164F3-704B-47FD-BDD7-A7DFDCB770AB}" type="datetimeFigureOut">
               <a:rPr lang="pl-PL" smtClean="0"/>
-              <a:t>2016-01-13</a:t>
+              <a:t>2016-01-14</a:t>
             </a:fld>
             <a:endParaRPr lang="pl-PL"/>
           </a:p>
@@ -1973,6 +2272,9 @@
   <p:clrMapOvr>
     <a:masterClrMapping/>
   </p:clrMapOvr>
+  <p:transition spd="slow">
+    <p:push dir="u"/>
+  </p:transition>
 </p:sldLayout>
 </file>
 
@@ -2282,7 +2584,7 @@
           <a:p>
             <a:fld id="{A03164F3-704B-47FD-BDD7-A7DFDCB770AB}" type="datetimeFigureOut">
               <a:rPr lang="pl-PL" smtClean="0"/>
-              <a:t>2016-01-13</a:t>
+              <a:t>2016-01-14</a:t>
             </a:fld>
             <a:endParaRPr lang="pl-PL"/>
           </a:p>
@@ -2340,6 +2642,9 @@
   <p:clrMapOvr>
     <a:masterClrMapping/>
   </p:clrMapOvr>
+  <p:transition spd="slow">
+    <p:push dir="u"/>
+  </p:transition>
 </p:sldLayout>
 </file>
 
@@ -2400,7 +2705,7 @@
           <a:p>
             <a:fld id="{A03164F3-704B-47FD-BDD7-A7DFDCB770AB}" type="datetimeFigureOut">
               <a:rPr lang="pl-PL" smtClean="0"/>
-              <a:t>2016-01-13</a:t>
+              <a:t>2016-01-14</a:t>
             </a:fld>
             <a:endParaRPr lang="pl-PL"/>
           </a:p>
@@ -2458,6 +2763,9 @@
   <p:clrMapOvr>
     <a:masterClrMapping/>
   </p:clrMapOvr>
+  <p:transition spd="slow">
+    <p:push dir="u"/>
+  </p:transition>
 </p:sldLayout>
 </file>
 
@@ -2495,7 +2803,7 @@
           <a:p>
             <a:fld id="{A03164F3-704B-47FD-BDD7-A7DFDCB770AB}" type="datetimeFigureOut">
               <a:rPr lang="pl-PL" smtClean="0"/>
-              <a:t>2016-01-13</a:t>
+              <a:t>2016-01-14</a:t>
             </a:fld>
             <a:endParaRPr lang="pl-PL"/>
           </a:p>
@@ -2553,6 +2861,9 @@
   <p:clrMapOvr>
     <a:masterClrMapping/>
   </p:clrMapOvr>
+  <p:transition spd="slow">
+    <p:push dir="u"/>
+  </p:transition>
 </p:sldLayout>
 </file>
 
@@ -2772,7 +3083,7 @@
           <a:p>
             <a:fld id="{A03164F3-704B-47FD-BDD7-A7DFDCB770AB}" type="datetimeFigureOut">
               <a:rPr lang="pl-PL" smtClean="0"/>
-              <a:t>2016-01-13</a:t>
+              <a:t>2016-01-14</a:t>
             </a:fld>
             <a:endParaRPr lang="pl-PL"/>
           </a:p>
@@ -2830,6 +3141,9 @@
   <p:clrMapOvr>
     <a:masterClrMapping/>
   </p:clrMapOvr>
+  <p:transition spd="slow">
+    <p:push dir="u"/>
+  </p:transition>
 </p:sldLayout>
 </file>
 
@@ -3025,7 +3339,7 @@
           <a:p>
             <a:fld id="{A03164F3-704B-47FD-BDD7-A7DFDCB770AB}" type="datetimeFigureOut">
               <a:rPr lang="pl-PL" smtClean="0"/>
-              <a:t>2016-01-13</a:t>
+              <a:t>2016-01-14</a:t>
             </a:fld>
             <a:endParaRPr lang="pl-PL"/>
           </a:p>
@@ -3083,6 +3397,9 @@
   <p:clrMapOvr>
     <a:masterClrMapping/>
   </p:clrMapOvr>
+  <p:transition spd="slow">
+    <p:push dir="u"/>
+  </p:transition>
 </p:sldLayout>
 </file>
 
@@ -3247,7 +3564,7 @@
           <a:p>
             <a:fld id="{A03164F3-704B-47FD-BDD7-A7DFDCB770AB}" type="datetimeFigureOut">
               <a:rPr lang="pl-PL" smtClean="0"/>
-              <a:t>2016-01-13</a:t>
+              <a:t>2016-01-14</a:t>
             </a:fld>
             <a:endParaRPr lang="pl-PL"/>
           </a:p>
@@ -3352,6 +3669,9 @@
     <p:sldLayoutId id="2147483658" r:id="rId10"/>
     <p:sldLayoutId id="2147483659" r:id="rId11"/>
   </p:sldLayoutIdLst>
+  <p:transition spd="slow">
+    <p:push dir="u"/>
+  </p:transition>
   <p:txStyles>
     <p:titleStyle>
       <a:lvl1pPr algn="l" defTabSz="914400" rtl="0" eaLnBrk="1" latinLnBrk="0" hangingPunct="1">
@@ -3757,18 +4077,9 @@
   <p:clrMapOvr>
     <a:masterClrMapping/>
   </p:clrMapOvr>
-  <mc:AlternateContent xmlns:mc="http://schemas.openxmlformats.org/markup-compatibility/2006" xmlns:p14="http://schemas.microsoft.com/office/powerpoint/2010/main">
-    <mc:Choice Requires="p14">
-      <p:transition spd="med" p14:dur="700">
-        <p:fade/>
-      </p:transition>
-    </mc:Choice>
-    <mc:Fallback xmlns="">
-      <p:transition spd="med">
-        <p:fade/>
-      </p:transition>
-    </mc:Fallback>
-  </mc:AlternateContent>
+  <p:transition spd="slow">
+    <p:push dir="u"/>
+  </p:transition>
   <p:timing>
     <p:tnLst>
       <p:par>
@@ -3803,26 +4114,20 @@
             <a:spLocks noGrp="1"/>
           </p:cNvSpPr>
           <p:nvPr>
-            <p:ph type="ctrTitle"/>
-          </p:nvPr>
-        </p:nvSpPr>
-        <p:spPr>
-          <a:xfrm>
-            <a:off x="1540934" y="1274763"/>
-            <a:ext cx="9144000" cy="2387600"/>
-          </a:xfrm>
-        </p:spPr>
-        <p:txBody>
-          <a:bodyPr/>
-          <a:lstStyle/>
-          <a:p>
+            <p:ph type="title"/>
+          </p:nvPr>
+        </p:nvSpPr>
+        <p:spPr/>
+        <p:txBody>
+          <a:bodyPr/>
+          <a:lstStyle/>
+          <a:p>
+            <a:pPr algn="ctr"/>
             <a:r>
               <a:rPr lang="pl-PL" dirty="0" smtClean="0">
                 <a:solidFill>
                   <a:schemeClr val="bg1"/>
                 </a:solidFill>
-                <a:latin typeface="Calibri" panose="020F0502020204030204" pitchFamily="34" charset="0"/>
-                <a:ea typeface="Adobe Fan Heiti Std B" panose="020B0700000000000000" pitchFamily="34" charset="-128"/>
               </a:rPr>
               <a:t>Ograniczenia</a:t>
             </a:r>
@@ -3830,33 +4135,83 @@
               <a:solidFill>
                 <a:schemeClr val="bg1"/>
               </a:solidFill>
-              <a:latin typeface="Calibri" panose="020F0502020204030204" pitchFamily="34" charset="0"/>
             </a:endParaRPr>
+          </a:p>
+        </p:txBody>
+      </p:sp>
+      <p:sp>
+        <p:nvSpPr>
+          <p:cNvPr id="3" name="Symbol zastępczy zawartości 2"/>
+          <p:cNvSpPr>
+            <a:spLocks noGrp="1"/>
+          </p:cNvSpPr>
+          <p:nvPr>
+            <p:ph idx="1"/>
+          </p:nvPr>
+        </p:nvSpPr>
+        <p:spPr/>
+        <p:txBody>
+          <a:bodyPr/>
+          <a:lstStyle/>
+          <a:p>
+            <a:r>
+              <a:rPr lang="pl-PL" dirty="0" smtClean="0">
+                <a:solidFill>
+                  <a:schemeClr val="bg1"/>
+                </a:solidFill>
+              </a:rPr>
+              <a:t>Wszystko co nie jest typem INT,BOOL,QNAME jest zamieniane na typ STRING</a:t>
+            </a:r>
+          </a:p>
+          <a:p>
+            <a:endParaRPr lang="pl-PL" dirty="0">
+              <a:solidFill>
+                <a:schemeClr val="bg1"/>
+              </a:solidFill>
+            </a:endParaRPr>
+          </a:p>
+          <a:p>
+            <a:r>
+              <a:rPr lang="pl-PL" dirty="0" smtClean="0">
+                <a:solidFill>
+                  <a:schemeClr val="bg1"/>
+                </a:solidFill>
+              </a:rPr>
+              <a:t>SAX PARSER nie ma wsparcia dla sprawdzania poprawności struktur oraz pliki DTD są ignorowane</a:t>
+            </a:r>
+          </a:p>
+          <a:p>
+            <a:endParaRPr lang="pl-PL" dirty="0">
+              <a:solidFill>
+                <a:schemeClr val="bg1"/>
+              </a:solidFill>
+            </a:endParaRPr>
+          </a:p>
+          <a:p>
+            <a:r>
+              <a:rPr lang="pl-PL" dirty="0" smtClean="0">
+                <a:solidFill>
+                  <a:schemeClr val="bg1"/>
+                </a:solidFill>
+              </a:rPr>
+              <a:t>W nazwach elementów i atrybutów obsługuje tylko te znaki, które obsługuje Erlang</a:t>
+            </a:r>
           </a:p>
         </p:txBody>
       </p:sp>
     </p:spTree>
     <p:extLst>
       <p:ext uri="{BB962C8B-B14F-4D97-AF65-F5344CB8AC3E}">
-        <p14:creationId xmlns:p14="http://schemas.microsoft.com/office/powerpoint/2010/main" val="1307152794"/>
+        <p14:creationId xmlns:p14="http://schemas.microsoft.com/office/powerpoint/2010/main" val="2985453934"/>
       </p:ext>
     </p:extLst>
   </p:cSld>
   <p:clrMapOvr>
     <a:masterClrMapping/>
   </p:clrMapOvr>
-  <mc:AlternateContent xmlns:mc="http://schemas.openxmlformats.org/markup-compatibility/2006" xmlns:p14="http://schemas.microsoft.com/office/powerpoint/2010/main">
-    <mc:Choice Requires="p14">
-      <p:transition spd="med" p14:dur="700">
-        <p:fade/>
-      </p:transition>
-    </mc:Choice>
-    <mc:Fallback xmlns="">
-      <p:transition spd="med">
-        <p:fade/>
-      </p:transition>
-    </mc:Fallback>
-  </mc:AlternateContent>
+  <p:transition spd="slow">
+    <p:push dir="u"/>
+  </p:transition>
   <p:timing>
     <p:tnLst>
       <p:par>
@@ -3905,31 +4260,54 @@
                 <a:solidFill>
                   <a:schemeClr val="bg1"/>
                 </a:solidFill>
+                <a:latin typeface="Calibri" panose="020F0502020204030204" pitchFamily="34" charset="0"/>
               </a:rPr>
-              <a:t>Ograniczenia</a:t>
-            </a:r>
+              <a:t>Fakty i brak mitów</a:t>
+            </a:r>
+            <a:endParaRPr lang="pl-PL" dirty="0">
+              <a:solidFill>
+                <a:schemeClr val="bg1"/>
+              </a:solidFill>
+              <a:latin typeface="Calibri" panose="020F0502020204030204" pitchFamily="34" charset="0"/>
+            </a:endParaRPr>
+          </a:p>
+        </p:txBody>
+      </p:sp>
+      <p:sp>
+        <p:nvSpPr>
+          <p:cNvPr id="3" name="Symbol zastępczy zawartości 2"/>
+          <p:cNvSpPr>
+            <a:spLocks noGrp="1"/>
+          </p:cNvSpPr>
+          <p:nvPr>
+            <p:ph idx="1"/>
+          </p:nvPr>
+        </p:nvSpPr>
+        <p:spPr/>
+        <p:txBody>
+          <a:bodyPr/>
+          <a:lstStyle/>
+          <a:p>
+            <a:endParaRPr lang="pl-PL" dirty="0" smtClean="0">
+              <a:solidFill>
+                <a:schemeClr val="bg1"/>
+              </a:solidFill>
+            </a:endParaRPr>
+          </a:p>
+          <a:p>
             <a:endParaRPr lang="pl-PL" dirty="0">
               <a:solidFill>
                 <a:schemeClr val="bg1"/>
               </a:solidFill>
             </a:endParaRPr>
           </a:p>
-        </p:txBody>
-      </p:sp>
-      <p:sp>
-        <p:nvSpPr>
-          <p:cNvPr id="3" name="Symbol zastępczy zawartości 2"/>
-          <p:cNvSpPr>
-            <a:spLocks noGrp="1"/>
-          </p:cNvSpPr>
-          <p:nvPr>
-            <p:ph idx="1"/>
-          </p:nvPr>
-        </p:nvSpPr>
-        <p:spPr/>
-        <p:txBody>
-          <a:bodyPr/>
-          <a:lstStyle/>
+          <a:p>
+            <a:endParaRPr lang="pl-PL" dirty="0" smtClean="0">
+              <a:solidFill>
+                <a:schemeClr val="bg1"/>
+              </a:solidFill>
+            </a:endParaRPr>
+          </a:p>
           <a:p>
             <a:r>
               <a:rPr lang="pl-PL" dirty="0" smtClean="0">
@@ -3937,55 +4315,83 @@
                   <a:schemeClr val="bg1"/>
                 </a:solidFill>
               </a:rPr>
-              <a:t>Wszystko co nie jest typem INT,BOOL,QNAME jest zamieniane na typ STRING</a:t>
-            </a:r>
-          </a:p>
-          <a:p>
+              <a:t>Link: github.com/</a:t>
+            </a:r>
+            <a:r>
+              <a:rPr lang="pl-PL" dirty="0" err="1" smtClean="0">
+                <a:solidFill>
+                  <a:schemeClr val="bg1"/>
+                </a:solidFill>
+              </a:rPr>
+              <a:t>willemdj</a:t>
+            </a:r>
+            <a:r>
+              <a:rPr lang="pl-PL" dirty="0" smtClean="0">
+                <a:solidFill>
+                  <a:schemeClr val="bg1"/>
+                </a:solidFill>
+              </a:rPr>
+              <a:t>/</a:t>
+            </a:r>
+            <a:r>
+              <a:rPr lang="pl-PL" dirty="0" err="1" smtClean="0">
+                <a:solidFill>
+                  <a:schemeClr val="bg1"/>
+                </a:solidFill>
+              </a:rPr>
+              <a:t>erlsom</a:t>
+            </a:r>
+            <a:endParaRPr lang="pl-PL" dirty="0" smtClean="0">
+              <a:solidFill>
+                <a:schemeClr val="bg1"/>
+              </a:solidFill>
+            </a:endParaRPr>
+          </a:p>
+          <a:p>
+            <a:r>
+              <a:rPr lang="pl-PL" dirty="0" smtClean="0">
+                <a:solidFill>
+                  <a:schemeClr val="bg1"/>
+                </a:solidFill>
+              </a:rPr>
+              <a:t>Licencja: GNU GENERAL PUBLIC LICENSE</a:t>
+            </a:r>
+          </a:p>
+          <a:p>
+            <a:r>
+              <a:rPr lang="pl-PL" dirty="0" smtClean="0">
+                <a:solidFill>
+                  <a:schemeClr val="bg1"/>
+                </a:solidFill>
+              </a:rPr>
+              <a:t>Data utworzenia : 2009</a:t>
+            </a:r>
+          </a:p>
+          <a:p>
+            <a:pPr marL="0" indent="0">
+              <a:buNone/>
+            </a:pPr>
             <a:endParaRPr lang="pl-PL" dirty="0">
               <a:solidFill>
                 <a:schemeClr val="bg1"/>
               </a:solidFill>
             </a:endParaRPr>
           </a:p>
-          <a:p>
-            <a:r>
-              <a:rPr lang="pl-PL" dirty="0" smtClean="0">
-                <a:solidFill>
-                  <a:schemeClr val="bg1"/>
-                </a:solidFill>
-              </a:rPr>
-              <a:t>SAX PARSER nie ma wsparcia dla sprawdzania poprawności struktur oraz pliki DTD są ignorowane</a:t>
-            </a:r>
-          </a:p>
-          <a:p>
-            <a:endParaRPr lang="pl-PL" dirty="0">
-              <a:solidFill>
-                <a:schemeClr val="bg1"/>
-              </a:solidFill>
-            </a:endParaRPr>
-          </a:p>
-          <a:p>
-            <a:r>
-              <a:rPr lang="pl-PL" dirty="0" smtClean="0">
-                <a:solidFill>
-                  <a:schemeClr val="bg1"/>
-                </a:solidFill>
-              </a:rPr>
-              <a:t>W nazwach elementów i atrybutów obsługuje tylko te znaki, które obsługuje Erlang</a:t>
-            </a:r>
-          </a:p>
         </p:txBody>
       </p:sp>
     </p:spTree>
     <p:extLst>
       <p:ext uri="{BB962C8B-B14F-4D97-AF65-F5344CB8AC3E}">
-        <p14:creationId xmlns:p14="http://schemas.microsoft.com/office/powerpoint/2010/main" val="2985453934"/>
+        <p14:creationId xmlns:p14="http://schemas.microsoft.com/office/powerpoint/2010/main" val="2705786263"/>
       </p:ext>
     </p:extLst>
   </p:cSld>
   <p:clrMapOvr>
     <a:masterClrMapping/>
   </p:clrMapOvr>
+  <p:transition spd="slow">
+    <p:push dir="u"/>
+  </p:transition>
   <p:timing>
     <p:tnLst>
       <p:par>
@@ -4061,18 +4467,9 @@
   <p:clrMapOvr>
     <a:masterClrMapping/>
   </p:clrMapOvr>
-  <mc:AlternateContent xmlns:mc="http://schemas.openxmlformats.org/markup-compatibility/2006" xmlns:p14="http://schemas.microsoft.com/office/powerpoint/2010/main">
-    <mc:Choice Requires="p14">
-      <p:transition spd="med" p14:dur="700">
-        <p:fade/>
-      </p:transition>
-    </mc:Choice>
-    <mc:Fallback xmlns="">
-      <p:transition spd="med">
-        <p:fade/>
-      </p:transition>
-    </mc:Fallback>
-  </mc:AlternateContent>
+  <p:transition spd="slow">
+    <p:push dir="u"/>
+  </p:transition>
   <p:timing>
     <p:tnLst>
       <p:par>
@@ -4212,6 +4609,9 @@
   <p:clrMapOvr>
     <a:masterClrMapping/>
   </p:clrMapOvr>
+  <p:transition spd="slow">
+    <p:push dir="u"/>
+  </p:transition>
   <p:timing>
     <p:tnLst>
       <p:par>
@@ -4338,6 +4738,9 @@
   <p:clrMapOvr>
     <a:masterClrMapping/>
   </p:clrMapOvr>
+  <p:transition spd="slow">
+    <p:push dir="u"/>
+  </p:transition>
   <p:timing>
     <p:tnLst>
       <p:par>
@@ -4464,6 +4867,9 @@
   <p:clrMapOvr>
     <a:masterClrMapping/>
   </p:clrMapOvr>
+  <p:transition spd="slow">
+    <p:push dir="u"/>
+  </p:transition>
   <p:timing>
     <p:tnLst>
       <p:par>
@@ -4539,18 +4945,9 @@
   <p:clrMapOvr>
     <a:masterClrMapping/>
   </p:clrMapOvr>
-  <mc:AlternateContent xmlns:mc="http://schemas.openxmlformats.org/markup-compatibility/2006" xmlns:p14="http://schemas.microsoft.com/office/powerpoint/2010/main">
-    <mc:Choice Requires="p14">
-      <p:transition spd="med" p14:dur="700">
-        <p:fade/>
-      </p:transition>
-    </mc:Choice>
-    <mc:Fallback xmlns="">
-      <p:transition spd="med">
-        <p:fade/>
-      </p:transition>
-    </mc:Fallback>
-  </mc:AlternateContent>
+  <p:transition spd="slow">
+    <p:push dir="u"/>
+  </p:transition>
   <p:timing>
     <p:tnLst>
       <p:par>
@@ -4645,6 +5042,9 @@
   <p:clrMapOvr>
     <a:masterClrMapping/>
   </p:clrMapOvr>
+  <p:transition spd="slow">
+    <p:push dir="u"/>
+  </p:transition>
   <p:timing>
     <p:tnLst>
       <p:par>
@@ -4721,18 +5121,9 @@
   <p:clrMapOvr>
     <a:masterClrMapping/>
   </p:clrMapOvr>
-  <mc:AlternateContent xmlns:mc="http://schemas.openxmlformats.org/markup-compatibility/2006" xmlns:p14="http://schemas.microsoft.com/office/powerpoint/2010/main">
-    <mc:Choice Requires="p14">
-      <p:transition spd="med" p14:dur="700">
-        <p:fade/>
-      </p:transition>
-    </mc:Choice>
-    <mc:Fallback xmlns="">
-      <p:transition spd="med">
-        <p:fade/>
-      </p:transition>
-    </mc:Fallback>
-  </mc:AlternateContent>
+  <p:transition spd="slow">
+    <p:push dir="u"/>
+  </p:transition>
   <p:timing>
     <p:tnLst>
       <p:par>
@@ -4767,23 +5158,28 @@
             <a:spLocks noGrp="1"/>
           </p:cNvSpPr>
           <p:nvPr>
-            <p:ph type="title"/>
-          </p:nvPr>
-        </p:nvSpPr>
-        <p:spPr/>
-        <p:txBody>
-          <a:bodyPr/>
-          <a:lstStyle/>
-          <a:p>
-            <a:pPr algn="ctr"/>
+            <p:ph type="ctrTitle"/>
+          </p:nvPr>
+        </p:nvSpPr>
+        <p:spPr>
+          <a:xfrm>
+            <a:off x="1540934" y="1274763"/>
+            <a:ext cx="9144000" cy="2387600"/>
+          </a:xfrm>
+        </p:spPr>
+        <p:txBody>
+          <a:bodyPr/>
+          <a:lstStyle/>
+          <a:p>
             <a:r>
               <a:rPr lang="pl-PL" dirty="0" smtClean="0">
                 <a:solidFill>
                   <a:schemeClr val="bg1"/>
                 </a:solidFill>
                 <a:latin typeface="Calibri" panose="020F0502020204030204" pitchFamily="34" charset="0"/>
+                <a:ea typeface="Adobe Fan Heiti Std B" panose="020B0700000000000000" pitchFamily="34" charset="-128"/>
               </a:rPr>
-              <a:t>Fakty i brak mitów</a:t>
+              <a:t>Ograniczenia</a:t>
             </a:r>
             <a:endParaRPr lang="pl-PL" dirty="0">
               <a:solidFill>
@@ -4794,134 +5190,19 @@
           </a:p>
         </p:txBody>
       </p:sp>
-      <p:sp>
-        <p:nvSpPr>
-          <p:cNvPr id="3" name="Symbol zastępczy zawartości 2"/>
-          <p:cNvSpPr>
-            <a:spLocks noGrp="1"/>
-          </p:cNvSpPr>
-          <p:nvPr>
-            <p:ph idx="1"/>
-          </p:nvPr>
-        </p:nvSpPr>
-        <p:spPr/>
-        <p:txBody>
-          <a:bodyPr/>
-          <a:lstStyle/>
-          <a:p>
-            <a:endParaRPr lang="pl-PL" dirty="0" smtClean="0">
-              <a:solidFill>
-                <a:schemeClr val="bg1"/>
-              </a:solidFill>
-            </a:endParaRPr>
-          </a:p>
-          <a:p>
-            <a:endParaRPr lang="pl-PL" dirty="0">
-              <a:solidFill>
-                <a:schemeClr val="bg1"/>
-              </a:solidFill>
-            </a:endParaRPr>
-          </a:p>
-          <a:p>
-            <a:endParaRPr lang="pl-PL" dirty="0" smtClean="0">
-              <a:solidFill>
-                <a:schemeClr val="bg1"/>
-              </a:solidFill>
-            </a:endParaRPr>
-          </a:p>
-          <a:p>
-            <a:r>
-              <a:rPr lang="pl-PL" dirty="0" smtClean="0">
-                <a:solidFill>
-                  <a:schemeClr val="bg1"/>
-                </a:solidFill>
-              </a:rPr>
-              <a:t>Link: github.com/</a:t>
-            </a:r>
-            <a:r>
-              <a:rPr lang="pl-PL" dirty="0" err="1" smtClean="0">
-                <a:solidFill>
-                  <a:schemeClr val="bg1"/>
-                </a:solidFill>
-              </a:rPr>
-              <a:t>willemdj</a:t>
-            </a:r>
-            <a:r>
-              <a:rPr lang="pl-PL" dirty="0" smtClean="0">
-                <a:solidFill>
-                  <a:schemeClr val="bg1"/>
-                </a:solidFill>
-              </a:rPr>
-              <a:t>/</a:t>
-            </a:r>
-            <a:r>
-              <a:rPr lang="pl-PL" dirty="0" err="1" smtClean="0">
-                <a:solidFill>
-                  <a:schemeClr val="bg1"/>
-                </a:solidFill>
-              </a:rPr>
-              <a:t>erlsom</a:t>
-            </a:r>
-            <a:endParaRPr lang="pl-PL" dirty="0" smtClean="0">
-              <a:solidFill>
-                <a:schemeClr val="bg1"/>
-              </a:solidFill>
-            </a:endParaRPr>
-          </a:p>
-          <a:p>
-            <a:r>
-              <a:rPr lang="pl-PL" dirty="0" smtClean="0">
-                <a:solidFill>
-                  <a:schemeClr val="bg1"/>
-                </a:solidFill>
-              </a:rPr>
-              <a:t>Licencja: GNU GENERAL PUBLIC LICENSE</a:t>
-            </a:r>
-          </a:p>
-          <a:p>
-            <a:r>
-              <a:rPr lang="pl-PL" dirty="0" smtClean="0">
-                <a:solidFill>
-                  <a:schemeClr val="bg1"/>
-                </a:solidFill>
-              </a:rPr>
-              <a:t>Data utworzenia : 2009</a:t>
-            </a:r>
-          </a:p>
-          <a:p>
-            <a:pPr marL="0" indent="0">
-              <a:buNone/>
-            </a:pPr>
-            <a:endParaRPr lang="pl-PL" dirty="0">
-              <a:solidFill>
-                <a:schemeClr val="bg1"/>
-              </a:solidFill>
-            </a:endParaRPr>
-          </a:p>
-        </p:txBody>
-      </p:sp>
     </p:spTree>
     <p:extLst>
       <p:ext uri="{BB962C8B-B14F-4D97-AF65-F5344CB8AC3E}">
-        <p14:creationId xmlns:p14="http://schemas.microsoft.com/office/powerpoint/2010/main" val="2705786263"/>
+        <p14:creationId xmlns:p14="http://schemas.microsoft.com/office/powerpoint/2010/main" val="1307152794"/>
       </p:ext>
     </p:extLst>
   </p:cSld>
   <p:clrMapOvr>
     <a:masterClrMapping/>
   </p:clrMapOvr>
-  <mc:AlternateContent xmlns:mc="http://schemas.openxmlformats.org/markup-compatibility/2006" xmlns:p14="http://schemas.microsoft.com/office/powerpoint/2010/main">
-    <mc:Choice Requires="p14">
-      <p:transition spd="med" p14:dur="700">
-        <p:fade/>
-      </p:transition>
-    </mc:Choice>
-    <mc:Fallback xmlns="">
-      <p:transition spd="med">
-        <p:fade/>
-      </p:transition>
-    </mc:Fallback>
-  </mc:AlternateContent>
+  <p:transition spd="slow">
+    <p:push dir="u"/>
+  </p:transition>
   <p:timing>
     <p:tnLst>
       <p:par>

</xml_diff>